<commit_message>
Delivered first draft of workshop
</commit_message>
<xml_diff>
--- a/src/data-visualization-01-points.pptx
+++ b/src/data-visualization-01-points.pptx
@@ -4759,6 +4759,14 @@
             </a:r>
             <a:r>
               <a:rPr/>
+              <a:t>bars,</a:t>
+            </a:r>
+            <a:r>
+              <a:rPr/>
+              <a:t> </a:t>
+            </a:r>
+            <a:r>
+              <a:rPr/>
               <a:t>or</a:t>
             </a:r>
             <a:r>
@@ -4767,7 +4775,7 @@
             </a:r>
             <a:r>
               <a:rPr/>
-              <a:t>bars,</a:t>
+              <a:t>text,</a:t>
             </a:r>
             <a:r>
               <a:rPr/>
@@ -4821,7 +4829,7 @@
             </a:r>
             <a:r>
               <a:rPr/>
-              <a:t>five</a:t>
+              <a:t>four</a:t>
             </a:r>
             <a:r>
               <a:rPr/>
@@ -4901,6 +4909,14 @@
             </a:r>
             <a:r>
               <a:rPr/>
+              <a:t>bars,</a:t>
+            </a:r>
+            <a:r>
+              <a:rPr/>
+              <a:t> </a:t>
+            </a:r>
+            <a:r>
+              <a:rPr/>
               <a:t>and</a:t>
             </a:r>
             <a:r>
@@ -4909,7 +4925,7 @@
             </a:r>
             <a:r>
               <a:rPr/>
-              <a:t>bars.</a:t>
+              <a:t>text.</a:t>
             </a:r>
           </a:p>
           <a:p>
@@ -5512,6 +5528,312 @@
             <a:fld id="{18BDFEC3-8487-43E8-A154-7C12CBC1FFF2}" type="slidenum">
               <a:rPr lang="en-US"/>
               <a:t>20</a:t>
+            </a:fld>
+            <a:endParaRPr lang="en-US"/>
+          </a:p>
+        </p:txBody>
+      </p:sp>
+    </p:spTree>
+  </p:cSld>
+</p:notes>
+</file>
+
+<file path=ppt/notesSlides/notesSlide16.xml><?xml version="1.0" encoding="utf-8"?>
+<p:notes xmlns:a="http://schemas.openxmlformats.org/drawingml/2006/main" xmlns:r="http://schemas.openxmlformats.org/officeDocument/2006/relationships" xmlns:p="http://schemas.openxmlformats.org/presentationml/2006/main">
+  <p:cSld>
+    <p:spTree>
+      <p:nvGrpSpPr>
+        <p:cNvPr id="1" name=""/>
+        <p:cNvGrpSpPr/>
+        <p:nvPr/>
+      </p:nvGrpSpPr>
+      <p:grpSpPr>
+        <a:xfrm>
+          <a:off x="0" y="0"/>
+          <a:ext cx="0" cy="0"/>
+          <a:chOff x="0" y="0"/>
+          <a:chExt cx="0" cy="0"/>
+        </a:xfrm>
+      </p:grpSpPr>
+      <p:sp>
+        <p:nvSpPr>
+          <p:cNvPr id="2" name="Slide Image Placeholder 1"/>
+          <p:cNvSpPr>
+            <a:spLocks noGrp="1" noRot="1" noChangeAspect="1"/>
+          </p:cNvSpPr>
+          <p:nvPr>
+            <p:ph type="sldImg"/>
+          </p:nvPr>
+        </p:nvSpPr>
+        <p:spPr/>
+      </p:sp>
+      <p:sp>
+        <p:nvSpPr>
+          <p:cNvPr id="3" name="Notes Placeholder 2"/>
+          <p:cNvSpPr>
+            <a:spLocks noGrp="1"/>
+          </p:cNvSpPr>
+          <p:nvPr>
+            <p:ph type="body" idx="1"/>
+          </p:nvPr>
+        </p:nvSpPr>
+        <p:spPr/>
+        <p:txBody>
+          <a:bodyPr/>
+          <a:lstStyle/>
+          <a:p>
+            <a:pPr lvl="0" marL="0" indent="0">
+              <a:buNone/>
+            </a:pPr>
+            <a:r>
+              <a:rPr/>
+              <a:t>I</a:t>
+            </a:r>
+            <a:r>
+              <a:rPr/>
+              <a:t> </a:t>
+            </a:r>
+            <a:r>
+              <a:rPr/>
+              <a:t>want</a:t>
+            </a:r>
+            <a:r>
+              <a:rPr/>
+              <a:t> </a:t>
+            </a:r>
+            <a:r>
+              <a:rPr/>
+              <a:t>you</a:t>
+            </a:r>
+            <a:r>
+              <a:rPr/>
+              <a:t> </a:t>
+            </a:r>
+            <a:r>
+              <a:rPr/>
+              <a:t>to</a:t>
+            </a:r>
+            <a:r>
+              <a:rPr/>
+              <a:t> </a:t>
+            </a:r>
+            <a:r>
+              <a:rPr/>
+              <a:t>review</a:t>
+            </a:r>
+            <a:r>
+              <a:rPr/>
+              <a:t> </a:t>
+            </a:r>
+            <a:r>
+              <a:rPr/>
+              <a:t>the</a:t>
+            </a:r>
+            <a:r>
+              <a:rPr/>
+              <a:t> </a:t>
+            </a:r>
+            <a:r>
+              <a:rPr/>
+              <a:t>visualizations</a:t>
+            </a:r>
+            <a:r>
+              <a:rPr/>
+              <a:t> </a:t>
+            </a:r>
+            <a:r>
+              <a:rPr/>
+              <a:t>that</a:t>
+            </a:r>
+            <a:r>
+              <a:rPr/>
+              <a:t> </a:t>
+            </a:r>
+            <a:r>
+              <a:rPr/>
+              <a:t>you</a:t>
+            </a:r>
+            <a:r>
+              <a:rPr/>
+              <a:t> </a:t>
+            </a:r>
+            <a:r>
+              <a:rPr/>
+              <a:t>discussed</a:t>
+            </a:r>
+            <a:r>
+              <a:rPr/>
+              <a:t> </a:t>
+            </a:r>
+            <a:r>
+              <a:rPr/>
+              <a:t>earlier.</a:t>
+            </a:r>
+            <a:r>
+              <a:rPr/>
+              <a:t> </a:t>
+            </a:r>
+            <a:r>
+              <a:rPr/>
+              <a:t>With</a:t>
+            </a:r>
+            <a:r>
+              <a:rPr/>
+              <a:t> </a:t>
+            </a:r>
+            <a:r>
+              <a:rPr/>
+              <a:t>you</a:t>
+            </a:r>
+            <a:r>
+              <a:rPr/>
+              <a:t> </a:t>
+            </a:r>
+            <a:r>
+              <a:rPr/>
+              <a:t>partner</a:t>
+            </a:r>
+            <a:r>
+              <a:rPr/>
+              <a:t> </a:t>
+            </a:r>
+            <a:r>
+              <a:rPr/>
+              <a:t>review</a:t>
+            </a:r>
+            <a:r>
+              <a:rPr/>
+              <a:t> </a:t>
+            </a:r>
+            <a:r>
+              <a:rPr/>
+              <a:t>the</a:t>
+            </a:r>
+            <a:r>
+              <a:rPr/>
+              <a:t> </a:t>
+            </a:r>
+            <a:r>
+              <a:rPr/>
+              <a:t>visualization</a:t>
+            </a:r>
+            <a:r>
+              <a:rPr/>
+              <a:t> </a:t>
+            </a:r>
+            <a:r>
+              <a:rPr/>
+              <a:t>again.</a:t>
+            </a:r>
+            <a:r>
+              <a:rPr/>
+              <a:t> </a:t>
+            </a:r>
+            <a:r>
+              <a:rPr/>
+              <a:t>Talk</a:t>
+            </a:r>
+            <a:r>
+              <a:rPr/>
+              <a:t> </a:t>
+            </a:r>
+            <a:r>
+              <a:rPr/>
+              <a:t>about</a:t>
+            </a:r>
+            <a:r>
+              <a:rPr/>
+              <a:t> </a:t>
+            </a:r>
+            <a:r>
+              <a:rPr/>
+              <a:t>the</a:t>
+            </a:r>
+            <a:r>
+              <a:rPr/>
+              <a:t> </a:t>
+            </a:r>
+            <a:r>
+              <a:rPr/>
+              <a:t>aesthetics</a:t>
+            </a:r>
+            <a:r>
+              <a:rPr/>
+              <a:t> </a:t>
+            </a:r>
+            <a:r>
+              <a:rPr/>
+              <a:t>and</a:t>
+            </a:r>
+            <a:r>
+              <a:rPr/>
+              <a:t> </a:t>
+            </a:r>
+            <a:r>
+              <a:rPr/>
+              <a:t>what</a:t>
+            </a:r>
+            <a:r>
+              <a:rPr/>
+              <a:t> </a:t>
+            </a:r>
+            <a:r>
+              <a:rPr/>
+              <a:t>variables</a:t>
+            </a:r>
+            <a:r>
+              <a:rPr/>
+              <a:t> </a:t>
+            </a:r>
+            <a:r>
+              <a:rPr/>
+              <a:t>map</a:t>
+            </a:r>
+            <a:r>
+              <a:rPr/>
+              <a:t> </a:t>
+            </a:r>
+            <a:r>
+              <a:rPr/>
+              <a:t>to</a:t>
+            </a:r>
+            <a:r>
+              <a:rPr/>
+              <a:t> </a:t>
+            </a:r>
+            <a:r>
+              <a:rPr/>
+              <a:t>each</a:t>
+            </a:r>
+            <a:r>
+              <a:rPr/>
+              <a:t> </a:t>
+            </a:r>
+            <a:r>
+              <a:rPr/>
+              <a:t>aesthetic.</a:t>
+            </a:r>
+          </a:p>
+        </p:txBody>
+      </p:sp>
+      <p:sp>
+        <p:nvSpPr>
+          <p:cNvPr id="4" name="Slide Number Placeholder 3"/>
+          <p:cNvSpPr>
+            <a:spLocks noGrp="1"/>
+          </p:cNvSpPr>
+          <p:nvPr>
+            <p:ph type="sldNum" sz="quarter" idx="10"/>
+          </p:nvPr>
+        </p:nvSpPr>
+        <p:spPr/>
+        <p:txBody>
+          <a:bodyPr/>
+          <a:lstStyle/>
+          <a:p>
+            <a:fld id="{18BDFEC3-8487-43E8-A154-7C12CBC1FFF2}" type="slidenum">
+              <a:rPr lang="en-US"/>
+              <a:t>39</a:t>
             </a:fld>
             <a:endParaRPr lang="en-US"/>
           </a:p>
@@ -7531,7 +7853,7 @@
             </a:r>
             <a:r>
               <a:rPr/>
-              <a:t>four</a:t>
+              <a:t>two</a:t>
             </a:r>
             <a:r>
               <a:rPr/>
@@ -17333,7 +17655,7 @@
             <a:pPr lvl="1"/>
             <a:r>
               <a:rPr/>
-              <a:t>Download and install Python, R, and Tableau</a:t>
+              <a:t>Download and install Python, R, or Tableau</a:t>
             </a:r>
           </a:p>
           <a:p>
@@ -18505,24 +18827,12 @@
             </a:r>
           </a:p>
           <a:p>
-            <a:pPr lvl="2"/>
-            <a:r>
-              <a:rPr/>
-              <a:t>What is the story that this graph is telling you?</a:t>
-            </a:r>
-          </a:p>
-          <a:p>
-            <a:pPr lvl="2"/>
-            <a:r>
-              <a:rPr/>
-              <a:t>Was there anything confusing?</a:t>
-            </a:r>
-          </a:p>
-          <a:p>
-            <a:pPr lvl="2"/>
-            <a:r>
-              <a:rPr/>
-              <a:t>Was there anything you might change?</a:t>
+            <a:pPr lvl="0" marL="0" indent="0">
+              <a:buNone/>
+            </a:pPr>
+            <a:r>
+              <a:rPr/>
+              <a:t>((Provide visualization. Maybe use the visualization from the earlier exercise?))</a:t>
             </a:r>
           </a:p>
         </p:txBody>
@@ -19362,7 +19672,7 @@
             </a:pPr>
             <a:r>
               <a:rPr/>
-              <a:t>((Find a totally different data set and get the students to draw four different visualizations.))</a:t>
+              <a:t>((Find a totally different data set and get the students to draw four different visualizations. Have them divide into groups that like the same visualization software and have each person do a different visualization.))</a:t>
             </a:r>
           </a:p>
         </p:txBody>

</xml_diff>